<commit_message>
maj prez ppt reste slidesn 3-8-10-11 + répartition à la soutenance
</commit_message>
<xml_diff>
--- a/Prez-Xamarin_AniMangApp.pptx
+++ b/Prez-Xamarin_AniMangApp.pptx
@@ -6,7 +6,7 @@
     <p:sldMasterId id="2147483661" r:id="rId2"/>
   </p:sldMasterIdLst>
   <p:notesMasterIdLst>
-    <p:notesMasterId r:id="rId16"/>
+    <p:notesMasterId r:id="rId15"/>
   </p:notesMasterIdLst>
   <p:sldIdLst>
     <p:sldId id="256" r:id="rId3"/>
@@ -21,7 +21,6 @@
     <p:sldId id="281" r:id="rId12"/>
     <p:sldId id="269" r:id="rId13"/>
     <p:sldId id="270" r:id="rId14"/>
-    <p:sldId id="273" r:id="rId15"/>
   </p:sldIdLst>
   <p:sldSz cx="12192000" cy="6858000"/>
   <p:notesSz cx="6858000" cy="9144000"/>
@@ -827,133 +826,6 @@
     <p:extLst>
       <p:ext uri="{BB962C8B-B14F-4D97-AF65-F5344CB8AC3E}">
         <p14:creationId xmlns:p14="http://schemas.microsoft.com/office/powerpoint/2010/main" val="2194974601"/>
-      </p:ext>
-    </p:extLst>
-  </p:cSld>
-  <p:clrMapOvr>
-    <a:masterClrMapping/>
-  </p:clrMapOvr>
-</p:notes>
-</file>
-
-<file path=ppt/notesSlides/notesSlide12.xml><?xml version="1.0" encoding="utf-8"?>
-<p:notes xmlns:a="http://schemas.openxmlformats.org/drawingml/2006/main" xmlns:r="http://schemas.openxmlformats.org/officeDocument/2006/relationships" xmlns:p="http://schemas.openxmlformats.org/presentationml/2006/main">
-  <p:cSld>
-    <p:spTree>
-      <p:nvGrpSpPr>
-        <p:cNvPr id="1" name=""/>
-        <p:cNvGrpSpPr/>
-        <p:nvPr/>
-      </p:nvGrpSpPr>
-      <p:grpSpPr>
-        <a:xfrm>
-          <a:off x="0" y="0"/>
-          <a:ext cx="0" cy="0"/>
-          <a:chOff x="0" y="0"/>
-          <a:chExt cx="0" cy="0"/>
-        </a:xfrm>
-      </p:grpSpPr>
-      <p:sp>
-        <p:nvSpPr>
-          <p:cNvPr id="180" name="PlaceHolder 1"/>
-          <p:cNvSpPr>
-            <a:spLocks noGrp="1" noRot="1" noChangeAspect="1"/>
-          </p:cNvSpPr>
-          <p:nvPr>
-            <p:ph type="sldImg"/>
-          </p:nvPr>
-        </p:nvSpPr>
-        <p:spPr>
-          <a:xfrm>
-            <a:off x="685800" y="1143000"/>
-            <a:ext cx="5486400" cy="3086100"/>
-          </a:xfrm>
-          <a:prstGeom prst="rect">
-            <a:avLst/>
-          </a:prstGeom>
-        </p:spPr>
-      </p:sp>
-      <p:sp>
-        <p:nvSpPr>
-          <p:cNvPr id="181" name="PlaceHolder 2"/>
-          <p:cNvSpPr>
-            <a:spLocks noGrp="1"/>
-          </p:cNvSpPr>
-          <p:nvPr>
-            <p:ph type="body"/>
-          </p:nvPr>
-        </p:nvSpPr>
-        <p:spPr>
-          <a:xfrm>
-            <a:off x="685800" y="4400640"/>
-            <a:ext cx="5485680" cy="3599640"/>
-          </a:xfrm>
-          <a:prstGeom prst="rect">
-            <a:avLst/>
-          </a:prstGeom>
-        </p:spPr>
-        <p:txBody>
-          <a:bodyPr lIns="0" tIns="0" rIns="0" bIns="0">
-            <a:noAutofit/>
-          </a:bodyPr>
-          <a:lstStyle/>
-          <a:p>
-            <a:endParaRPr lang="fr-FR" sz="2000" b="0" strike="noStrike" spc="-1">
-              <a:latin typeface="Arial"/>
-            </a:endParaRPr>
-          </a:p>
-        </p:txBody>
-      </p:sp>
-      <p:sp>
-        <p:nvSpPr>
-          <p:cNvPr id="182" name="TextShape 3"/>
-          <p:cNvSpPr txBox="1"/>
-          <p:nvPr/>
-        </p:nvSpPr>
-        <p:spPr>
-          <a:xfrm>
-            <a:off x="3884760" y="8685360"/>
-            <a:ext cx="2971080" cy="457920"/>
-          </a:xfrm>
-          <a:prstGeom prst="rect">
-            <a:avLst/>
-          </a:prstGeom>
-          <a:noFill/>
-          <a:ln>
-            <a:noFill/>
-          </a:ln>
-        </p:spPr>
-        <p:txBody>
-          <a:bodyPr lIns="0" tIns="0" rIns="0" bIns="0" anchor="b">
-            <a:noAutofit/>
-          </a:bodyPr>
-          <a:lstStyle/>
-          <a:p>
-            <a:pPr algn="r">
-              <a:lnSpc>
-                <a:spcPct val="100000"/>
-              </a:lnSpc>
-            </a:pPr>
-            <a:fld id="{4747F0A8-470C-48FF-8F5E-554798825A9B}" type="slidenum">
-              <a:rPr lang="fr-FR" sz="1200" b="0" strike="noStrike" spc="-1">
-                <a:solidFill>
-                  <a:srgbClr val="000000"/>
-                </a:solidFill>
-                <a:latin typeface="Arial"/>
-                <a:ea typeface="Arial"/>
-              </a:rPr>
-              <a:t>13</a:t>
-            </a:fld>
-            <a:endParaRPr lang="fr-FR" sz="1200" b="0" strike="noStrike" spc="-1">
-              <a:latin typeface="Times New Roman"/>
-            </a:endParaRPr>
-          </a:p>
-        </p:txBody>
-      </p:sp>
-    </p:spTree>
-    <p:extLst>
-      <p:ext uri="{BB962C8B-B14F-4D97-AF65-F5344CB8AC3E}">
-        <p14:creationId xmlns:p14="http://schemas.microsoft.com/office/powerpoint/2010/main" val="3130707736"/>
       </p:ext>
     </p:extLst>
   </p:cSld>
@@ -6297,7 +6169,7 @@
               <a:t>Projet </a:t>
             </a:r>
             <a:r>
-              <a:rPr kumimoji="0" lang="fr-FR" sz="2000" b="1" i="0" u="sng" strike="noStrike" kern="1200" cap="none" spc="-1" normalizeH="0" baseline="0" noProof="0" dirty="0" err="1">
+              <a:rPr kumimoji="0" lang="fr-FR" sz="2000" b="1" i="0" u="sng" strike="noStrike" kern="1200" cap="none" spc="-1" normalizeH="0" baseline="0" noProof="0" dirty="0" err="1" smtClean="0">
                 <a:ln>
                   <a:noFill/>
                 </a:ln>
@@ -6312,6 +6184,64 @@
               </a:rPr>
               <a:t>AniMangApp</a:t>
             </a:r>
+            <a:endParaRPr kumimoji="0" lang="fr-FR" sz="2000" b="1" i="0" u="sng" strike="noStrike" kern="1200" cap="none" spc="-1" normalizeH="0" baseline="0" noProof="0" dirty="0" smtClean="0">
+              <a:ln>
+                <a:noFill/>
+              </a:ln>
+              <a:solidFill>
+                <a:srgbClr val="000000"/>
+              </a:solidFill>
+              <a:effectLst/>
+              <a:uLnTx/>
+              <a:uFillTx/>
+              <a:latin typeface="Arial"/>
+              <a:ea typeface="Arial"/>
+            </a:endParaRPr>
+          </a:p>
+          <a:p>
+            <a:pPr marL="0" marR="0" lvl="0" indent="0" algn="ctr" defTabSz="914400" rtl="0" eaLnBrk="1" fontAlgn="auto" latinLnBrk="0" hangingPunct="1">
+              <a:lnSpc>
+                <a:spcPct val="100000"/>
+              </a:lnSpc>
+              <a:spcBef>
+                <a:spcPts val="0"/>
+              </a:spcBef>
+              <a:spcAft>
+                <a:spcPts val="0"/>
+              </a:spcAft>
+              <a:buClrTx/>
+              <a:buSzTx/>
+              <a:buFontTx/>
+              <a:buNone/>
+              <a:tabLst/>
+              <a:defRPr/>
+            </a:pPr>
+            <a:endParaRPr lang="fr-FR" sz="2000" b="1" u="sng" spc="-1" dirty="0">
+              <a:solidFill>
+                <a:srgbClr val="000000"/>
+              </a:solidFill>
+              <a:latin typeface="Arial"/>
+              <a:ea typeface="Arial"/>
+            </a:endParaRPr>
+          </a:p>
+          <a:p>
+            <a:pPr marL="0" marR="0" lvl="0" indent="0" algn="ctr" defTabSz="914400" rtl="0" eaLnBrk="1" fontAlgn="auto" latinLnBrk="0" hangingPunct="1">
+              <a:lnSpc>
+                <a:spcPct val="100000"/>
+              </a:lnSpc>
+              <a:spcBef>
+                <a:spcPts val="0"/>
+              </a:spcBef>
+              <a:spcAft>
+                <a:spcPts val="0"/>
+              </a:spcAft>
+              <a:buClrTx/>
+              <a:buSzTx/>
+              <a:buFontTx/>
+              <a:buNone/>
+              <a:tabLst/>
+              <a:defRPr/>
+            </a:pPr>
             <a:r>
               <a:rPr kumimoji="0" lang="fr-FR" sz="2000" b="0" i="0" u="none" strike="noStrike" kern="1200" cap="none" spc="-1" normalizeH="0" baseline="0" noProof="0" dirty="0">
                 <a:ln>
@@ -6511,6 +6441,98 @@
           <a:ln>
             <a:noFill/>
           </a:ln>
+        </p:spPr>
+      </p:pic>
+      <p:pic>
+        <p:nvPicPr>
+          <p:cNvPr id="6" name="Image 5"/>
+          <p:cNvPicPr>
+            <a:picLocks noChangeAspect="1"/>
+          </p:cNvPicPr>
+          <p:nvPr/>
+        </p:nvPicPr>
+        <p:blipFill rotWithShape="1">
+          <a:blip r:embed="rId3"/>
+          <a:srcRect l="-781" t="75666" b="1738"/>
+          <a:stretch/>
+        </p:blipFill>
+        <p:spPr>
+          <a:xfrm>
+            <a:off x="4963101" y="4272031"/>
+            <a:ext cx="540993" cy="509451"/>
+          </a:xfrm>
+          <a:prstGeom prst="rect">
+            <a:avLst/>
+          </a:prstGeom>
+        </p:spPr>
+      </p:pic>
+      <p:pic>
+        <p:nvPicPr>
+          <p:cNvPr id="7" name="Image 6"/>
+          <p:cNvPicPr>
+            <a:picLocks noChangeAspect="1"/>
+          </p:cNvPicPr>
+          <p:nvPr/>
+        </p:nvPicPr>
+        <p:blipFill rotWithShape="1">
+          <a:blip r:embed="rId3"/>
+          <a:srcRect l="-781" t="26418" b="50986"/>
+          <a:stretch/>
+        </p:blipFill>
+        <p:spPr>
+          <a:xfrm>
+            <a:off x="2887864" y="4272031"/>
+            <a:ext cx="540993" cy="509451"/>
+          </a:xfrm>
+          <a:prstGeom prst="rect">
+            <a:avLst/>
+          </a:prstGeom>
+        </p:spPr>
+      </p:pic>
+      <p:pic>
+        <p:nvPicPr>
+          <p:cNvPr id="8" name="Image 7"/>
+          <p:cNvPicPr>
+            <a:picLocks noChangeAspect="1"/>
+          </p:cNvPicPr>
+          <p:nvPr/>
+        </p:nvPicPr>
+        <p:blipFill rotWithShape="1">
+          <a:blip r:embed="rId3"/>
+          <a:srcRect l="-781" t="50752" b="26652"/>
+          <a:stretch/>
+        </p:blipFill>
+        <p:spPr>
+          <a:xfrm>
+            <a:off x="7281129" y="4272031"/>
+            <a:ext cx="540993" cy="509451"/>
+          </a:xfrm>
+          <a:prstGeom prst="rect">
+            <a:avLst/>
+          </a:prstGeom>
+        </p:spPr>
+      </p:pic>
+      <p:pic>
+        <p:nvPicPr>
+          <p:cNvPr id="9" name="Image 8"/>
+          <p:cNvPicPr>
+            <a:picLocks noChangeAspect="1"/>
+          </p:cNvPicPr>
+          <p:nvPr/>
+        </p:nvPicPr>
+        <p:blipFill rotWithShape="1">
+          <a:blip r:embed="rId3"/>
+          <a:srcRect l="-781" t="925" b="76479"/>
+          <a:stretch/>
+        </p:blipFill>
+        <p:spPr>
+          <a:xfrm>
+            <a:off x="9588492" y="4272031"/>
+            <a:ext cx="540993" cy="509451"/>
+          </a:xfrm>
+          <a:prstGeom prst="rect">
+            <a:avLst/>
+          </a:prstGeom>
         </p:spPr>
       </p:pic>
     </p:spTree>
@@ -6988,6 +7010,29 @@
           </a:p>
         </p:txBody>
       </p:sp>
+      <p:pic>
+        <p:nvPicPr>
+          <p:cNvPr id="14" name="Image 13"/>
+          <p:cNvPicPr>
+            <a:picLocks noChangeAspect="1"/>
+          </p:cNvPicPr>
+          <p:nvPr/>
+        </p:nvPicPr>
+        <p:blipFill rotWithShape="1">
+          <a:blip r:embed="rId6"/>
+          <a:srcRect l="-781" t="77404"/>
+          <a:stretch/>
+        </p:blipFill>
+        <p:spPr>
+          <a:xfrm>
+            <a:off x="11414451" y="6348549"/>
+            <a:ext cx="540993" cy="509451"/>
+          </a:xfrm>
+          <a:prstGeom prst="rect">
+            <a:avLst/>
+          </a:prstGeom>
+        </p:spPr>
+      </p:pic>
     </p:spTree>
     <p:extLst>
       <p:ext uri="{BB962C8B-B14F-4D97-AF65-F5344CB8AC3E}">
@@ -7233,6 +7278,35 @@
               </a:rPr>
               <a:t>Accéder à la totalité des données sans surcharger la page</a:t>
             </a:r>
+          </a:p>
+          <a:p>
+            <a:pPr marL="457200" indent="-457200">
+              <a:lnSpc>
+                <a:spcPct val="90000"/>
+              </a:lnSpc>
+              <a:buFont typeface="Wingdings" panose="05000000000000000000" pitchFamily="2" charset="2"/>
+              <a:buChar char="q"/>
+            </a:pPr>
+            <a:r>
+              <a:rPr lang="fr-FR" sz="2800" spc="-1" dirty="0" smtClean="0">
+                <a:solidFill>
+                  <a:srgbClr val="FF0000"/>
+                </a:solidFill>
+                <a:latin typeface="Calibri" panose="020F0502020204030204" pitchFamily="34" charset="0"/>
+                <a:cs typeface="Calibri" panose="020F0502020204030204" pitchFamily="34" charset="0"/>
+              </a:rPr>
+              <a:t>Faire </a:t>
+            </a:r>
+            <a:r>
+              <a:rPr lang="fr-FR" sz="2800" spc="-1" smtClean="0">
+                <a:solidFill>
+                  <a:srgbClr val="FF0000"/>
+                </a:solidFill>
+                <a:latin typeface="Calibri" panose="020F0502020204030204" pitchFamily="34" charset="0"/>
+                <a:cs typeface="Calibri" panose="020F0502020204030204" pitchFamily="34" charset="0"/>
+              </a:rPr>
+              <a:t>une recherche</a:t>
+            </a:r>
             <a:endParaRPr lang="fr-FR" sz="2800" spc="-1" dirty="0">
               <a:solidFill>
                 <a:srgbClr val="FF0000"/>
@@ -7354,6 +7428,29 @@
           <a:ln>
             <a:noFill/>
           </a:ln>
+        </p:spPr>
+      </p:pic>
+      <p:pic>
+        <p:nvPicPr>
+          <p:cNvPr id="6" name="Image 5"/>
+          <p:cNvPicPr>
+            <a:picLocks noChangeAspect="1"/>
+          </p:cNvPicPr>
+          <p:nvPr/>
+        </p:nvPicPr>
+        <p:blipFill rotWithShape="1">
+          <a:blip r:embed="rId4"/>
+          <a:srcRect l="-781" t="77404"/>
+          <a:stretch/>
+        </p:blipFill>
+        <p:spPr>
+          <a:xfrm>
+            <a:off x="11414451" y="6348549"/>
+            <a:ext cx="540993" cy="509451"/>
+          </a:xfrm>
+          <a:prstGeom prst="rect">
+            <a:avLst/>
+          </a:prstGeom>
         </p:spPr>
       </p:pic>
     </p:spTree>
@@ -7641,7 +7738,7 @@
         </p:blipFill>
         <p:spPr>
           <a:xfrm>
-            <a:off x="4796108" y="3549317"/>
+            <a:off x="4795627" y="2665057"/>
             <a:ext cx="2599783" cy="1952155"/>
           </a:xfrm>
           <a:prstGeom prst="rect">
@@ -7650,548 +7747,104 @@
           <a:ln>
             <a:noFill/>
           </a:ln>
+        </p:spPr>
+      </p:pic>
+      <p:pic>
+        <p:nvPicPr>
+          <p:cNvPr id="14" name="Image 13"/>
+          <p:cNvPicPr>
+            <a:picLocks noChangeAspect="1"/>
+          </p:cNvPicPr>
+          <p:nvPr/>
+        </p:nvPicPr>
+        <p:blipFill rotWithShape="1">
+          <a:blip r:embed="rId6"/>
+          <a:srcRect l="-781" t="77404"/>
+          <a:stretch/>
+        </p:blipFill>
+        <p:spPr>
+          <a:xfrm>
+            <a:off x="5655433" y="5088964"/>
+            <a:ext cx="540993" cy="509451"/>
+          </a:xfrm>
+          <a:prstGeom prst="rect">
+            <a:avLst/>
+          </a:prstGeom>
+        </p:spPr>
+      </p:pic>
+      <p:pic>
+        <p:nvPicPr>
+          <p:cNvPr id="15" name="Image 14"/>
+          <p:cNvPicPr>
+            <a:picLocks noChangeAspect="1"/>
+          </p:cNvPicPr>
+          <p:nvPr/>
+        </p:nvPicPr>
+        <p:blipFill rotWithShape="1">
+          <a:blip r:embed="rId6"/>
+          <a:srcRect l="-781" t="26418" b="50986"/>
+          <a:stretch/>
+        </p:blipFill>
+        <p:spPr>
+          <a:xfrm>
+            <a:off x="5114440" y="5088964"/>
+            <a:ext cx="540993" cy="509451"/>
+          </a:xfrm>
+          <a:prstGeom prst="rect">
+            <a:avLst/>
+          </a:prstGeom>
+        </p:spPr>
+      </p:pic>
+      <p:pic>
+        <p:nvPicPr>
+          <p:cNvPr id="16" name="Image 15"/>
+          <p:cNvPicPr>
+            <a:picLocks noChangeAspect="1"/>
+          </p:cNvPicPr>
+          <p:nvPr/>
+        </p:nvPicPr>
+        <p:blipFill rotWithShape="1">
+          <a:blip r:embed="rId6"/>
+          <a:srcRect l="-3215" t="51911" r="2433" b="25493"/>
+          <a:stretch/>
+        </p:blipFill>
+        <p:spPr>
+          <a:xfrm>
+            <a:off x="6196426" y="5088964"/>
+            <a:ext cx="540993" cy="509451"/>
+          </a:xfrm>
+          <a:prstGeom prst="rect">
+            <a:avLst/>
+          </a:prstGeom>
+        </p:spPr>
+      </p:pic>
+      <p:pic>
+        <p:nvPicPr>
+          <p:cNvPr id="17" name="Image 16"/>
+          <p:cNvPicPr>
+            <a:picLocks noChangeAspect="1"/>
+          </p:cNvPicPr>
+          <p:nvPr/>
+        </p:nvPicPr>
+        <p:blipFill rotWithShape="1">
+          <a:blip r:embed="rId6"/>
+          <a:srcRect l="-781" t="925" b="76479"/>
+          <a:stretch/>
+        </p:blipFill>
+        <p:spPr>
+          <a:xfrm>
+            <a:off x="6737419" y="5088964"/>
+            <a:ext cx="540993" cy="509451"/>
+          </a:xfrm>
+          <a:prstGeom prst="rect">
+            <a:avLst/>
+          </a:prstGeom>
         </p:spPr>
       </p:pic>
     </p:spTree>
     <p:extLst>
       <p:ext uri="{BB962C8B-B14F-4D97-AF65-F5344CB8AC3E}">
         <p14:creationId xmlns:p14="http://schemas.microsoft.com/office/powerpoint/2010/main" val="4275375089"/>
-      </p:ext>
-    </p:extLst>
-  </p:cSld>
-  <p:clrMapOvr>
-    <a:masterClrMapping/>
-  </p:clrMapOvr>
-</p:sld>
-</file>
-
-<file path=ppt/slides/slide13.xml><?xml version="1.0" encoding="utf-8"?>
-<p:sld xmlns:a="http://schemas.openxmlformats.org/drawingml/2006/main" xmlns:r="http://schemas.openxmlformats.org/officeDocument/2006/relationships" xmlns:p="http://schemas.openxmlformats.org/presentationml/2006/main">
-  <p:cSld>
-    <p:spTree>
-      <p:nvGrpSpPr>
-        <p:cNvPr id="1" name=""/>
-        <p:cNvGrpSpPr/>
-        <p:nvPr/>
-      </p:nvGrpSpPr>
-      <p:grpSpPr>
-        <a:xfrm>
-          <a:off x="0" y="0"/>
-          <a:ext cx="0" cy="0"/>
-          <a:chOff x="0" y="0"/>
-          <a:chExt cx="0" cy="0"/>
-        </a:xfrm>
-      </p:grpSpPr>
-      <p:sp>
-        <p:nvSpPr>
-          <p:cNvPr id="124" name="TextShape 1"/>
-          <p:cNvSpPr txBox="1"/>
-          <p:nvPr/>
-        </p:nvSpPr>
-        <p:spPr>
-          <a:xfrm>
-            <a:off x="838080" y="365040"/>
-            <a:ext cx="10514880" cy="1324800"/>
-          </a:xfrm>
-          <a:prstGeom prst="rect">
-            <a:avLst/>
-          </a:prstGeom>
-          <a:noFill/>
-          <a:ln>
-            <a:noFill/>
-          </a:ln>
-        </p:spPr>
-        <p:txBody>
-          <a:bodyPr anchor="ctr">
-            <a:noAutofit/>
-          </a:bodyPr>
-          <a:lstStyle/>
-          <a:p>
-            <a:pPr>
-              <a:lnSpc>
-                <a:spcPct val="90000"/>
-              </a:lnSpc>
-            </a:pPr>
-            <a:r>
-              <a:rPr lang="fr-FR" sz="4400" b="0" u="sng" strike="noStrike" spc="-1" dirty="0">
-                <a:solidFill>
-                  <a:srgbClr val="000000"/>
-                </a:solidFill>
-                <a:latin typeface="Calibri"/>
-                <a:ea typeface="Calibri"/>
-              </a:rPr>
-              <a:t>Notation </a:t>
-            </a:r>
-            <a:endParaRPr lang="fr-FR" sz="4400" b="0" u="sng" strike="noStrike" spc="-1" dirty="0">
-              <a:solidFill>
-                <a:srgbClr val="000000"/>
-              </a:solidFill>
-              <a:latin typeface="Arial"/>
-            </a:endParaRPr>
-          </a:p>
-        </p:txBody>
-      </p:sp>
-      <p:sp>
-        <p:nvSpPr>
-          <p:cNvPr id="126" name="TextShape 3"/>
-          <p:cNvSpPr txBox="1"/>
-          <p:nvPr/>
-        </p:nvSpPr>
-        <p:spPr>
-          <a:xfrm>
-            <a:off x="838080" y="6310800"/>
-            <a:ext cx="10514880" cy="364320"/>
-          </a:xfrm>
-          <a:prstGeom prst="rect">
-            <a:avLst/>
-          </a:prstGeom>
-          <a:noFill/>
-          <a:ln>
-            <a:noFill/>
-          </a:ln>
-        </p:spPr>
-        <p:txBody>
-          <a:bodyPr anchor="ctr">
-            <a:noAutofit/>
-          </a:bodyPr>
-          <a:lstStyle/>
-          <a:p>
-            <a:pPr algn="r">
-              <a:lnSpc>
-                <a:spcPct val="100000"/>
-              </a:lnSpc>
-            </a:pPr>
-            <a:fld id="{6FCBB62F-1338-4001-9E26-1F88BCF587A4}" type="slidenum">
-              <a:rPr lang="fr-FR" sz="1200" b="0" strike="noStrike" spc="-1" smtClean="0">
-                <a:solidFill>
-                  <a:srgbClr val="8B8B8B"/>
-                </a:solidFill>
-                <a:latin typeface="Calibri"/>
-                <a:ea typeface="Calibri"/>
-              </a:rPr>
-              <a:t>13</a:t>
-            </a:fld>
-            <a:endParaRPr lang="fr-FR" sz="1200" b="0" strike="noStrike" spc="-1" dirty="0">
-              <a:latin typeface="Times New Roman"/>
-            </a:endParaRPr>
-          </a:p>
-        </p:txBody>
-      </p:sp>
-      <p:pic>
-        <p:nvPicPr>
-          <p:cNvPr id="127" name="Google Shape;133;p2"/>
-          <p:cNvPicPr/>
-          <p:nvPr/>
-        </p:nvPicPr>
-        <p:blipFill>
-          <a:blip r:embed="rId3"/>
-          <a:stretch/>
-        </p:blipFill>
-        <p:spPr>
-          <a:xfrm>
-            <a:off x="10572120" y="0"/>
-            <a:ext cx="1619640" cy="1619640"/>
-          </a:xfrm>
-          <a:prstGeom prst="rect">
-            <a:avLst/>
-          </a:prstGeom>
-          <a:ln>
-            <a:noFill/>
-          </a:ln>
-        </p:spPr>
-      </p:pic>
-      <p:sp>
-        <p:nvSpPr>
-          <p:cNvPr id="9" name="TextBox 8">
-            <a:extLst>
-              <a:ext uri="{FF2B5EF4-FFF2-40B4-BE49-F238E27FC236}">
-                <a16:creationId xmlns:a16="http://schemas.microsoft.com/office/drawing/2014/main" id="{62D731FD-5616-4203-812F-09E7FDEAEBC1}"/>
-              </a:ext>
-            </a:extLst>
-          </p:cNvPr>
-          <p:cNvSpPr txBox="1"/>
-          <p:nvPr/>
-        </p:nvSpPr>
-        <p:spPr>
-          <a:xfrm>
-            <a:off x="240" y="1781473"/>
-            <a:ext cx="12191760" cy="4893647"/>
-          </a:xfrm>
-          <a:prstGeom prst="rect">
-            <a:avLst/>
-          </a:prstGeom>
-          <a:noFill/>
-        </p:spPr>
-        <p:txBody>
-          <a:bodyPr wrap="square">
-            <a:spAutoFit/>
-          </a:bodyPr>
-          <a:lstStyle/>
-          <a:p>
-            <a:pPr marL="0" marR="0" lvl="0" indent="0" algn="ctr" defTabSz="914400" rtl="0" eaLnBrk="1" fontAlgn="auto" latinLnBrk="0" hangingPunct="1">
-              <a:lnSpc>
-                <a:spcPct val="100000"/>
-              </a:lnSpc>
-              <a:spcBef>
-                <a:spcPts val="0"/>
-              </a:spcBef>
-              <a:spcAft>
-                <a:spcPts val="0"/>
-              </a:spcAft>
-              <a:buClrTx/>
-              <a:buSzTx/>
-              <a:buFontTx/>
-              <a:buNone/>
-              <a:tabLst/>
-              <a:defRPr/>
-            </a:pPr>
-            <a:r>
-              <a:rPr lang="fr-FR" sz="2400" dirty="0">
-                <a:solidFill>
-                  <a:srgbClr val="FF0000"/>
-                </a:solidFill>
-              </a:rPr>
-              <a:t>Architecture MVVM</a:t>
-            </a:r>
-          </a:p>
-          <a:p>
-            <a:pPr marL="0" marR="0" lvl="0" indent="0" algn="ctr" defTabSz="914400" rtl="0" eaLnBrk="1" fontAlgn="auto" latinLnBrk="0" hangingPunct="1">
-              <a:lnSpc>
-                <a:spcPct val="100000"/>
-              </a:lnSpc>
-              <a:spcBef>
-                <a:spcPts val="0"/>
-              </a:spcBef>
-              <a:spcAft>
-                <a:spcPts val="0"/>
-              </a:spcAft>
-              <a:buClrTx/>
-              <a:buSzTx/>
-              <a:buFontTx/>
-              <a:buNone/>
-              <a:tabLst/>
-              <a:defRPr/>
-            </a:pPr>
-            <a:endParaRPr lang="fr-FR" sz="2400" dirty="0">
-              <a:solidFill>
-                <a:srgbClr val="FF0000"/>
-              </a:solidFill>
-            </a:endParaRPr>
-          </a:p>
-          <a:p>
-            <a:pPr marL="0" marR="0" lvl="0" indent="0" algn="ctr" defTabSz="914400" rtl="0" eaLnBrk="1" fontAlgn="auto" latinLnBrk="0" hangingPunct="1">
-              <a:lnSpc>
-                <a:spcPct val="100000"/>
-              </a:lnSpc>
-              <a:spcBef>
-                <a:spcPts val="0"/>
-              </a:spcBef>
-              <a:spcAft>
-                <a:spcPts val="0"/>
-              </a:spcAft>
-              <a:buClrTx/>
-              <a:buSzTx/>
-              <a:buFontTx/>
-              <a:buNone/>
-              <a:tabLst/>
-              <a:defRPr/>
-            </a:pPr>
-            <a:r>
-              <a:rPr lang="fr-FR" sz="2400" dirty="0"/>
-              <a:t>Fonctionnement sur Android et iOS</a:t>
-            </a:r>
-          </a:p>
-          <a:p>
-            <a:pPr marL="0" marR="0" lvl="0" indent="0" algn="ctr" defTabSz="914400" rtl="0" eaLnBrk="1" fontAlgn="auto" latinLnBrk="0" hangingPunct="1">
-              <a:lnSpc>
-                <a:spcPct val="100000"/>
-              </a:lnSpc>
-              <a:spcBef>
-                <a:spcPts val="0"/>
-              </a:spcBef>
-              <a:spcAft>
-                <a:spcPts val="0"/>
-              </a:spcAft>
-              <a:buClrTx/>
-              <a:buSzTx/>
-              <a:buFontTx/>
-              <a:buNone/>
-              <a:tabLst/>
-              <a:defRPr/>
-            </a:pPr>
-            <a:endParaRPr lang="fr-FR" sz="2400" dirty="0"/>
-          </a:p>
-          <a:p>
-            <a:pPr marL="0" marR="0" lvl="0" indent="0" algn="ctr" defTabSz="914400" rtl="0" eaLnBrk="1" fontAlgn="auto" latinLnBrk="0" hangingPunct="1">
-              <a:lnSpc>
-                <a:spcPct val="100000"/>
-              </a:lnSpc>
-              <a:spcBef>
-                <a:spcPts val="0"/>
-              </a:spcBef>
-              <a:spcAft>
-                <a:spcPts val="0"/>
-              </a:spcAft>
-              <a:buClrTx/>
-              <a:buSzTx/>
-              <a:buFontTx/>
-              <a:buNone/>
-              <a:tabLst/>
-              <a:defRPr/>
-            </a:pPr>
-            <a:r>
-              <a:rPr lang="fr-FR" sz="2400" dirty="0"/>
-              <a:t>FONCTIONNALITES</a:t>
-            </a:r>
-          </a:p>
-          <a:p>
-            <a:pPr marL="0" marR="0" lvl="0" indent="0" algn="ctr" defTabSz="914400" rtl="0" eaLnBrk="1" fontAlgn="auto" latinLnBrk="0" hangingPunct="1">
-              <a:lnSpc>
-                <a:spcPct val="100000"/>
-              </a:lnSpc>
-              <a:spcBef>
-                <a:spcPts val="0"/>
-              </a:spcBef>
-              <a:spcAft>
-                <a:spcPts val="0"/>
-              </a:spcAft>
-              <a:buClrTx/>
-              <a:buSzTx/>
-              <a:buFontTx/>
-              <a:buNone/>
-              <a:tabLst/>
-              <a:defRPr/>
-            </a:pPr>
-            <a:r>
-              <a:rPr lang="fr-FR" sz="2400" dirty="0"/>
-              <a:t>Persistance de certaines données </a:t>
-            </a:r>
-          </a:p>
-          <a:p>
-            <a:pPr marL="0" marR="0" lvl="0" indent="0" algn="ctr" defTabSz="914400" rtl="0" eaLnBrk="1" fontAlgn="auto" latinLnBrk="0" hangingPunct="1">
-              <a:lnSpc>
-                <a:spcPct val="100000"/>
-              </a:lnSpc>
-              <a:spcBef>
-                <a:spcPts val="0"/>
-              </a:spcBef>
-              <a:spcAft>
-                <a:spcPts val="0"/>
-              </a:spcAft>
-              <a:buClrTx/>
-              <a:buSzTx/>
-              <a:buFontTx/>
-              <a:buNone/>
-              <a:tabLst/>
-              <a:defRPr/>
-            </a:pPr>
-            <a:r>
-              <a:rPr lang="fr-FR" sz="2400" dirty="0"/>
-              <a:t>API externe </a:t>
-            </a:r>
-          </a:p>
-          <a:p>
-            <a:pPr marL="0" marR="0" lvl="0" indent="0" algn="ctr" defTabSz="914400" rtl="0" eaLnBrk="1" fontAlgn="auto" latinLnBrk="0" hangingPunct="1">
-              <a:lnSpc>
-                <a:spcPct val="100000"/>
-              </a:lnSpc>
-              <a:spcBef>
-                <a:spcPts val="0"/>
-              </a:spcBef>
-              <a:spcAft>
-                <a:spcPts val="0"/>
-              </a:spcAft>
-              <a:buClrTx/>
-              <a:buSzTx/>
-              <a:buFontTx/>
-              <a:buNone/>
-              <a:tabLst/>
-              <a:defRPr/>
-            </a:pPr>
-            <a:r>
-              <a:rPr lang="fr-FR" sz="2400" dirty="0"/>
-              <a:t>Personnalisation native (Custom </a:t>
-            </a:r>
-            <a:r>
-              <a:rPr lang="fr-FR" sz="2400" dirty="0" err="1"/>
-              <a:t>Renderer</a:t>
-            </a:r>
-            <a:r>
-              <a:rPr lang="fr-FR" sz="2400" dirty="0"/>
-              <a:t> et </a:t>
-            </a:r>
-            <a:r>
-              <a:rPr lang="fr-FR" sz="2400" dirty="0" err="1"/>
-              <a:t>Dependency</a:t>
-            </a:r>
-            <a:r>
-              <a:rPr lang="fr-FR" sz="2400" dirty="0"/>
-              <a:t> Service) </a:t>
-            </a:r>
-          </a:p>
-          <a:p>
-            <a:pPr marL="0" marR="0" lvl="0" indent="0" algn="ctr" defTabSz="914400" rtl="0" eaLnBrk="1" fontAlgn="auto" latinLnBrk="0" hangingPunct="1">
-              <a:lnSpc>
-                <a:spcPct val="100000"/>
-              </a:lnSpc>
-              <a:spcBef>
-                <a:spcPts val="0"/>
-              </a:spcBef>
-              <a:spcAft>
-                <a:spcPts val="0"/>
-              </a:spcAft>
-              <a:buClrTx/>
-              <a:buSzTx/>
-              <a:buFontTx/>
-              <a:buNone/>
-              <a:tabLst/>
-              <a:defRPr/>
-            </a:pPr>
-            <a:r>
-              <a:rPr lang="fr-FR" sz="2400" dirty="0"/>
-              <a:t>navigation avancée (</a:t>
-            </a:r>
-            <a:r>
-              <a:rPr lang="fr-FR" sz="2400" dirty="0" err="1"/>
-              <a:t>TabbedPage</a:t>
-            </a:r>
-            <a:r>
-              <a:rPr lang="fr-FR" sz="2400" dirty="0"/>
-              <a:t>, </a:t>
-            </a:r>
-            <a:r>
-              <a:rPr lang="fr-FR" sz="2400" dirty="0" err="1"/>
-              <a:t>SideMenu</a:t>
-            </a:r>
-            <a:r>
-              <a:rPr lang="fr-FR" sz="2400" dirty="0"/>
-              <a:t>…)</a:t>
-            </a:r>
-          </a:p>
-          <a:p>
-            <a:pPr marL="0" marR="0" lvl="0" indent="0" algn="ctr" defTabSz="914400" rtl="0" eaLnBrk="1" fontAlgn="auto" latinLnBrk="0" hangingPunct="1">
-              <a:lnSpc>
-                <a:spcPct val="100000"/>
-              </a:lnSpc>
-              <a:spcBef>
-                <a:spcPts val="0"/>
-              </a:spcBef>
-              <a:spcAft>
-                <a:spcPts val="0"/>
-              </a:spcAft>
-              <a:buClrTx/>
-              <a:buSzTx/>
-              <a:buFontTx/>
-              <a:buNone/>
-              <a:tabLst/>
-              <a:defRPr/>
-            </a:pPr>
-            <a:endParaRPr lang="fr-FR" sz="2400" dirty="0"/>
-          </a:p>
-          <a:p>
-            <a:pPr marL="0" marR="0" lvl="0" indent="0" algn="ctr" defTabSz="914400" rtl="0" eaLnBrk="1" fontAlgn="auto" latinLnBrk="0" hangingPunct="1">
-              <a:lnSpc>
-                <a:spcPct val="100000"/>
-              </a:lnSpc>
-              <a:spcBef>
-                <a:spcPts val="0"/>
-              </a:spcBef>
-              <a:spcAft>
-                <a:spcPts val="0"/>
-              </a:spcAft>
-              <a:buClrTx/>
-              <a:buSzTx/>
-              <a:buFontTx/>
-              <a:buNone/>
-              <a:tabLst/>
-              <a:defRPr/>
-            </a:pPr>
-            <a:r>
-              <a:rPr lang="fr-FR" sz="2400" dirty="0">
-                <a:solidFill>
-                  <a:srgbClr val="FF0000"/>
-                </a:solidFill>
-              </a:rPr>
-              <a:t>Qualité du code (commentaires, complexité)</a:t>
-            </a:r>
-            <a:endParaRPr lang="fr-FR" sz="2400" spc="-1" dirty="0">
-              <a:solidFill>
-                <a:srgbClr val="FF0000"/>
-              </a:solidFill>
-              <a:latin typeface="Arial"/>
-            </a:endParaRPr>
-          </a:p>
-          <a:p>
-            <a:pPr marL="0" marR="0" lvl="0" indent="0" algn="ctr" defTabSz="914400" rtl="0" eaLnBrk="1" fontAlgn="auto" latinLnBrk="0" hangingPunct="1">
-              <a:lnSpc>
-                <a:spcPct val="100000"/>
-              </a:lnSpc>
-              <a:spcBef>
-                <a:spcPts val="0"/>
-              </a:spcBef>
-              <a:spcAft>
-                <a:spcPts val="0"/>
-              </a:spcAft>
-              <a:buClrTx/>
-              <a:buSzTx/>
-              <a:buFontTx/>
-              <a:buNone/>
-              <a:tabLst/>
-              <a:defRPr/>
-            </a:pPr>
-            <a:r>
-              <a:rPr lang="fr-FR" sz="2400" dirty="0"/>
-              <a:t>Régularité des </a:t>
-            </a:r>
-            <a:r>
-              <a:rPr lang="fr-FR" sz="2400" dirty="0" err="1"/>
-              <a:t>commits</a:t>
-            </a:r>
-            <a:r>
-              <a:rPr lang="fr-FR" sz="2400" dirty="0"/>
-              <a:t>, respect des deadlines et du cahier des charges fournis</a:t>
-            </a:r>
-            <a:endParaRPr lang="fr-FR" sz="2400" spc="-1" dirty="0">
-              <a:solidFill>
-                <a:srgbClr val="000000"/>
-              </a:solidFill>
-              <a:latin typeface="Arial"/>
-            </a:endParaRPr>
-          </a:p>
-          <a:p>
-            <a:pPr marL="0" marR="0" lvl="0" indent="0" algn="ctr" defTabSz="914400" rtl="0" eaLnBrk="1" fontAlgn="auto" latinLnBrk="0" hangingPunct="1">
-              <a:lnSpc>
-                <a:spcPct val="100000"/>
-              </a:lnSpc>
-              <a:spcBef>
-                <a:spcPts val="0"/>
-              </a:spcBef>
-              <a:spcAft>
-                <a:spcPts val="0"/>
-              </a:spcAft>
-              <a:buClrTx/>
-              <a:buSzTx/>
-              <a:buFontTx/>
-              <a:buNone/>
-              <a:tabLst/>
-              <a:defRPr/>
-            </a:pPr>
-            <a:r>
-              <a:rPr lang="fr-FR" sz="2400" spc="-1" dirty="0">
-                <a:solidFill>
-                  <a:srgbClr val="000000"/>
-                </a:solidFill>
-                <a:latin typeface="Arial"/>
-              </a:rPr>
-              <a:t>Présentation finale</a:t>
-            </a:r>
-          </a:p>
-        </p:txBody>
-      </p:sp>
-    </p:spTree>
-    <p:extLst>
-      <p:ext uri="{BB962C8B-B14F-4D97-AF65-F5344CB8AC3E}">
-        <p14:creationId xmlns:p14="http://schemas.microsoft.com/office/powerpoint/2010/main" val="2414072749"/>
       </p:ext>
     </p:extLst>
   </p:cSld>
@@ -8218,6 +7871,45 @@
           <a:chExt cx="0" cy="0"/>
         </a:xfrm>
       </p:grpSpPr>
+      <p:pic>
+        <p:nvPicPr>
+          <p:cNvPr id="2050" name="Picture 2" descr="4,579 Live Demo Stock Photos, Pictures &amp; Royalty-Free Images - iStock"/>
+          <p:cNvPicPr>
+            <a:picLocks noChangeAspect="1" noChangeArrowheads="1"/>
+          </p:cNvPicPr>
+          <p:nvPr/>
+        </p:nvPicPr>
+        <p:blipFill rotWithShape="1">
+          <a:blip r:embed="rId3">
+            <a:extLst>
+              <a:ext uri="{28A0092B-C50C-407E-A947-70E740481C1C}">
+                <a14:useLocalDpi xmlns:a14="http://schemas.microsoft.com/office/drawing/2010/main" val="0"/>
+              </a:ext>
+            </a:extLst>
+          </a:blip>
+          <a:srcRect t="28371"/>
+          <a:stretch/>
+        </p:blipFill>
+        <p:spPr bwMode="auto">
+          <a:xfrm>
+            <a:off x="5048257" y="2050869"/>
+            <a:ext cx="2143125" cy="1535109"/>
+          </a:xfrm>
+          <a:prstGeom prst="rect">
+            <a:avLst/>
+          </a:prstGeom>
+          <a:noFill/>
+          <a:extLst>
+            <a:ext uri="{909E8E84-426E-40DD-AFC4-6F175D3DCCD1}">
+              <a14:hiddenFill xmlns:a14="http://schemas.microsoft.com/office/drawing/2010/main">
+                <a:solidFill>
+                  <a:srgbClr val="FFFFFF"/>
+                </a:solidFill>
+              </a14:hiddenFill>
+            </a:ext>
+          </a:extLst>
+        </p:spPr>
+      </p:pic>
       <p:sp>
         <p:nvSpPr>
           <p:cNvPr id="124" name="TextShape 1"/>
@@ -8350,7 +8042,7 @@
           <p:nvPr/>
         </p:nvPicPr>
         <p:blipFill>
-          <a:blip r:embed="rId3"/>
+          <a:blip r:embed="rId4"/>
           <a:stretch/>
         </p:blipFill>
         <p:spPr>
@@ -8366,6 +8058,363 @@
           </a:ln>
         </p:spPr>
       </p:pic>
+      <p:pic>
+        <p:nvPicPr>
+          <p:cNvPr id="3" name="Image 2"/>
+          <p:cNvPicPr>
+            <a:picLocks noChangeAspect="1"/>
+          </p:cNvPicPr>
+          <p:nvPr/>
+        </p:nvPicPr>
+        <p:blipFill rotWithShape="1">
+          <a:blip r:embed="rId5"/>
+          <a:srcRect l="-781" t="26418" b="50986"/>
+          <a:stretch/>
+        </p:blipFill>
+        <p:spPr>
+          <a:xfrm>
+            <a:off x="11414451" y="6348549"/>
+            <a:ext cx="540993" cy="509451"/>
+          </a:xfrm>
+          <a:prstGeom prst="rect">
+            <a:avLst/>
+          </a:prstGeom>
+        </p:spPr>
+      </p:pic>
+      <p:sp>
+        <p:nvSpPr>
+          <p:cNvPr id="4" name="Rectangle 3"/>
+          <p:cNvSpPr/>
+          <p:nvPr/>
+        </p:nvSpPr>
+        <p:spPr>
+          <a:xfrm>
+            <a:off x="3048000" y="3105835"/>
+            <a:ext cx="6096000" cy="369332"/>
+          </a:xfrm>
+          <a:prstGeom prst="rect">
+            <a:avLst/>
+          </a:prstGeom>
+        </p:spPr>
+        <p:txBody>
+          <a:bodyPr>
+            <a:spAutoFit/>
+          </a:bodyPr>
+          <a:lstStyle/>
+          <a:p>
+            <a:endParaRPr lang="fr-FR" dirty="0"/>
+          </a:p>
+        </p:txBody>
+      </p:sp>
+      <p:sp>
+        <p:nvSpPr>
+          <p:cNvPr id="8" name="TextShape 2"/>
+          <p:cNvSpPr txBox="1"/>
+          <p:nvPr/>
+        </p:nvSpPr>
+        <p:spPr>
+          <a:xfrm>
+            <a:off x="1083123" y="3213463"/>
+            <a:ext cx="10073394" cy="2508068"/>
+          </a:xfrm>
+          <a:prstGeom prst="rect">
+            <a:avLst/>
+          </a:prstGeom>
+          <a:noFill/>
+          <a:ln>
+            <a:noFill/>
+          </a:ln>
+        </p:spPr>
+        <p:txBody>
+          <a:bodyPr lIns="0" tIns="0" rIns="0" bIns="0">
+            <a:noAutofit/>
+          </a:bodyPr>
+          <a:lstStyle/>
+          <a:p>
+            <a:pPr algn="ctr">
+              <a:lnSpc>
+                <a:spcPct val="90000"/>
+              </a:lnSpc>
+            </a:pPr>
+            <a:r>
+              <a:rPr lang="fr-FR" sz="2400" b="1" spc="-1" dirty="0" err="1" smtClean="0">
+                <a:solidFill>
+                  <a:srgbClr val="CC0099"/>
+                </a:solidFill>
+                <a:latin typeface="Calibri"/>
+                <a:ea typeface="Calibri"/>
+              </a:rPr>
+              <a:t>Ani</a:t>
+            </a:r>
+            <a:r>
+              <a:rPr lang="fr-FR" sz="2400" b="1" spc="-1" dirty="0" err="1" smtClean="0">
+                <a:solidFill>
+                  <a:srgbClr val="FF6CFD"/>
+                </a:solidFill>
+                <a:latin typeface="Calibri"/>
+                <a:ea typeface="Calibri"/>
+              </a:rPr>
+              <a:t>Mang</a:t>
+            </a:r>
+            <a:r>
+              <a:rPr lang="fr-FR" sz="2400" b="1" spc="-1" dirty="0" err="1" smtClean="0">
+                <a:solidFill>
+                  <a:srgbClr val="3DC5EF"/>
+                </a:solidFill>
+                <a:latin typeface="Calibri"/>
+                <a:ea typeface="Calibri"/>
+              </a:rPr>
+              <a:t>App</a:t>
+            </a:r>
+            <a:r>
+              <a:rPr lang="fr-FR" sz="2400" b="1" spc="-1" dirty="0" smtClean="0">
+                <a:solidFill>
+                  <a:srgbClr val="000000"/>
+                </a:solidFill>
+                <a:latin typeface="Calibri"/>
+                <a:ea typeface="Calibri"/>
+              </a:rPr>
+              <a:t> </a:t>
+            </a:r>
+            <a:br>
+              <a:rPr lang="fr-FR" sz="2400" b="1" spc="-1" dirty="0" smtClean="0">
+                <a:solidFill>
+                  <a:srgbClr val="000000"/>
+                </a:solidFill>
+                <a:latin typeface="Calibri"/>
+                <a:ea typeface="Calibri"/>
+              </a:rPr>
+            </a:br>
+            <a:r>
+              <a:rPr lang="fr-FR" sz="2400" b="1" spc="-1" dirty="0" smtClean="0">
+                <a:solidFill>
+                  <a:srgbClr val="000000"/>
+                </a:solidFill>
+                <a:latin typeface="Calibri"/>
+                <a:ea typeface="Calibri"/>
+              </a:rPr>
+              <a:t/>
+            </a:r>
+            <a:br>
+              <a:rPr lang="fr-FR" sz="2400" b="1" spc="-1" dirty="0" smtClean="0">
+                <a:solidFill>
+                  <a:srgbClr val="000000"/>
+                </a:solidFill>
+                <a:latin typeface="Calibri"/>
+                <a:ea typeface="Calibri"/>
+              </a:rPr>
+            </a:br>
+            <a:r>
+              <a:rPr lang="fr-FR" sz="2000" spc="-1" dirty="0" smtClean="0">
+                <a:solidFill>
+                  <a:srgbClr val="000000"/>
+                </a:solidFill>
+                <a:latin typeface="Calibri"/>
+                <a:ea typeface="Calibri"/>
+              </a:rPr>
+              <a:t>une </a:t>
+            </a:r>
+            <a:r>
+              <a:rPr lang="fr-FR" sz="2000" b="1" spc="-1" dirty="0">
+                <a:solidFill>
+                  <a:srgbClr val="3DC5EF"/>
+                </a:solidFill>
+                <a:latin typeface="Calibri"/>
+                <a:ea typeface="Calibri"/>
+              </a:rPr>
+              <a:t>application</a:t>
+            </a:r>
+            <a:r>
+              <a:rPr lang="fr-FR" sz="2000" spc="-1" dirty="0">
+                <a:solidFill>
+                  <a:srgbClr val="0070C0"/>
+                </a:solidFill>
+                <a:latin typeface="Calibri"/>
+                <a:ea typeface="Calibri"/>
+              </a:rPr>
+              <a:t> </a:t>
+            </a:r>
+            <a:r>
+              <a:rPr lang="fr-FR" sz="2000" spc="-1" dirty="0" smtClean="0">
+                <a:solidFill>
+                  <a:srgbClr val="0070C0"/>
+                </a:solidFill>
+                <a:latin typeface="Calibri"/>
+                <a:ea typeface="Calibri"/>
+              </a:rPr>
+              <a:t/>
+            </a:r>
+            <a:br>
+              <a:rPr lang="fr-FR" sz="2000" spc="-1" dirty="0" smtClean="0">
+                <a:solidFill>
+                  <a:srgbClr val="0070C0"/>
+                </a:solidFill>
+                <a:latin typeface="Calibri"/>
+                <a:ea typeface="Calibri"/>
+              </a:rPr>
+            </a:br>
+            <a:r>
+              <a:rPr lang="fr-FR" sz="2000" spc="-1" dirty="0" smtClean="0">
+                <a:solidFill>
+                  <a:srgbClr val="000000"/>
+                </a:solidFill>
+                <a:latin typeface="Calibri"/>
+                <a:ea typeface="Calibri"/>
+              </a:rPr>
+              <a:t>pour </a:t>
+            </a:r>
+            <a:r>
+              <a:rPr lang="fr-FR" sz="2000" spc="-1" dirty="0">
+                <a:solidFill>
+                  <a:srgbClr val="000000"/>
+                </a:solidFill>
+                <a:latin typeface="Calibri"/>
+                <a:ea typeface="Calibri"/>
+              </a:rPr>
+              <a:t>la communauté </a:t>
+            </a:r>
+            <a:r>
+              <a:rPr lang="fr-FR" sz="2000" spc="-1" dirty="0" smtClean="0">
+                <a:solidFill>
+                  <a:srgbClr val="000000"/>
+                </a:solidFill>
+                <a:latin typeface="Calibri"/>
+                <a:ea typeface="Calibri"/>
+              </a:rPr>
+              <a:t/>
+            </a:r>
+            <a:br>
+              <a:rPr lang="fr-FR" sz="2000" spc="-1" dirty="0" smtClean="0">
+                <a:solidFill>
+                  <a:srgbClr val="000000"/>
+                </a:solidFill>
+                <a:latin typeface="Calibri"/>
+                <a:ea typeface="Calibri"/>
+              </a:rPr>
+            </a:br>
+            <a:r>
+              <a:rPr lang="fr-FR" sz="2000" spc="-1" dirty="0" smtClean="0">
+                <a:solidFill>
+                  <a:srgbClr val="000000"/>
+                </a:solidFill>
+                <a:latin typeface="Calibri"/>
+                <a:ea typeface="Calibri"/>
+              </a:rPr>
+              <a:t>des </a:t>
+            </a:r>
+            <a:r>
+              <a:rPr lang="fr-FR" sz="2000" b="1" spc="-1" dirty="0">
+                <a:solidFill>
+                  <a:srgbClr val="CC0099"/>
+                </a:solidFill>
+                <a:latin typeface="Calibri"/>
+                <a:ea typeface="Calibri"/>
+              </a:rPr>
+              <a:t>animés</a:t>
+            </a:r>
+            <a:r>
+              <a:rPr lang="fr-FR" sz="2000" spc="-1" dirty="0">
+                <a:solidFill>
+                  <a:srgbClr val="CC0099"/>
+                </a:solidFill>
+                <a:latin typeface="Calibri"/>
+                <a:ea typeface="Calibri"/>
+              </a:rPr>
+              <a:t> </a:t>
+            </a:r>
+            <a:r>
+              <a:rPr lang="fr-FR" sz="2000" spc="-1" dirty="0" smtClean="0">
+                <a:solidFill>
+                  <a:srgbClr val="CC0099"/>
+                </a:solidFill>
+                <a:latin typeface="Calibri"/>
+                <a:ea typeface="Calibri"/>
+              </a:rPr>
+              <a:t/>
+            </a:r>
+            <a:br>
+              <a:rPr lang="fr-FR" sz="2000" spc="-1" dirty="0" smtClean="0">
+                <a:solidFill>
+                  <a:srgbClr val="CC0099"/>
+                </a:solidFill>
+                <a:latin typeface="Calibri"/>
+                <a:ea typeface="Calibri"/>
+              </a:rPr>
+            </a:br>
+            <a:r>
+              <a:rPr lang="fr-FR" sz="2000" spc="-1" dirty="0" smtClean="0">
+                <a:solidFill>
+                  <a:srgbClr val="000000"/>
+                </a:solidFill>
+                <a:latin typeface="Calibri"/>
+                <a:ea typeface="Calibri"/>
+              </a:rPr>
+              <a:t>et des </a:t>
+            </a:r>
+            <a:r>
+              <a:rPr lang="fr-FR" sz="2000" b="1" spc="-1" dirty="0" smtClean="0">
+                <a:solidFill>
+                  <a:srgbClr val="FF6CFD"/>
+                </a:solidFill>
+                <a:latin typeface="Calibri"/>
+                <a:ea typeface="Calibri"/>
+              </a:rPr>
+              <a:t>mangas </a:t>
+            </a:r>
+          </a:p>
+          <a:p>
+            <a:pPr algn="ctr">
+              <a:lnSpc>
+                <a:spcPct val="90000"/>
+              </a:lnSpc>
+            </a:pPr>
+            <a:r>
+              <a:rPr lang="fr-FR" sz="2000" spc="-1" dirty="0" smtClean="0">
+                <a:solidFill>
+                  <a:srgbClr val="000000"/>
+                </a:solidFill>
+                <a:latin typeface="Calibri"/>
+                <a:ea typeface="Calibri"/>
+              </a:rPr>
+              <a:t>…</a:t>
+            </a:r>
+            <a:r>
+              <a:rPr kumimoji="0" lang="fr-FR" sz="2000" b="0" i="0" u="none" strike="noStrike" kern="1200" cap="none" spc="-1" normalizeH="0" baseline="0" noProof="0" dirty="0">
+                <a:ln>
+                  <a:noFill/>
+                </a:ln>
+                <a:solidFill>
+                  <a:srgbClr val="000000"/>
+                </a:solidFill>
+                <a:effectLst/>
+                <a:uLnTx/>
+                <a:uFillTx/>
+                <a:latin typeface="Arial"/>
+                <a:ea typeface="Arial"/>
+              </a:rPr>
+              <a:t/>
+            </a:r>
+            <a:br>
+              <a:rPr kumimoji="0" lang="fr-FR" sz="2000" b="0" i="0" u="none" strike="noStrike" kern="1200" cap="none" spc="-1" normalizeH="0" baseline="0" noProof="0" dirty="0">
+                <a:ln>
+                  <a:noFill/>
+                </a:ln>
+                <a:solidFill>
+                  <a:srgbClr val="000000"/>
+                </a:solidFill>
+                <a:effectLst/>
+                <a:uLnTx/>
+                <a:uFillTx/>
+                <a:latin typeface="Arial"/>
+                <a:ea typeface="Arial"/>
+              </a:rPr>
+            </a:br>
+            <a:endParaRPr lang="fr-FR" sz="2400" b="0" strike="noStrike" spc="-1" dirty="0">
+              <a:latin typeface="Arial"/>
+            </a:endParaRPr>
+          </a:p>
+        </p:txBody>
+      </p:sp>
     </p:spTree>
   </p:cSld>
   <p:clrMapOvr>
@@ -8886,6 +8935,29 @@
           </a:prstGeom>
         </p:spPr>
       </p:pic>
+      <p:pic>
+        <p:nvPicPr>
+          <p:cNvPr id="15" name="Image 14"/>
+          <p:cNvPicPr>
+            <a:picLocks noChangeAspect="1"/>
+          </p:cNvPicPr>
+          <p:nvPr/>
+        </p:nvPicPr>
+        <p:blipFill rotWithShape="1">
+          <a:blip r:embed="rId9"/>
+          <a:srcRect l="-781" t="77404"/>
+          <a:stretch/>
+        </p:blipFill>
+        <p:spPr>
+          <a:xfrm>
+            <a:off x="11414451" y="6348549"/>
+            <a:ext cx="540993" cy="509451"/>
+          </a:xfrm>
+          <a:prstGeom prst="rect">
+            <a:avLst/>
+          </a:prstGeom>
+        </p:spPr>
+      </p:pic>
     </p:spTree>
     <p:extLst>
       <p:ext uri="{BB962C8B-B14F-4D97-AF65-F5344CB8AC3E}">
@@ -9326,7 +9398,7 @@
           <a:noFill/>
           <a:ln>
             <a:solidFill>
-              <a:schemeClr val="accent2"/>
+              <a:srgbClr val="FF6CFD"/>
             </a:solidFill>
           </a:ln>
         </p:spPr>
@@ -9372,7 +9444,7 @@
           <a:noFill/>
           <a:ln>
             <a:solidFill>
-              <a:schemeClr val="accent2"/>
+              <a:srgbClr val="FF6CFD"/>
             </a:solidFill>
           </a:ln>
         </p:spPr>
@@ -9419,6 +9491,29 @@
           <a:xfrm>
             <a:off x="571315" y="2835997"/>
             <a:ext cx="4695825" cy="2505075"/>
+          </a:xfrm>
+          <a:prstGeom prst="rect">
+            <a:avLst/>
+          </a:prstGeom>
+        </p:spPr>
+      </p:pic>
+      <p:pic>
+        <p:nvPicPr>
+          <p:cNvPr id="13" name="Image 12"/>
+          <p:cNvPicPr>
+            <a:picLocks noChangeAspect="1"/>
+          </p:cNvPicPr>
+          <p:nvPr/>
+        </p:nvPicPr>
+        <p:blipFill rotWithShape="1">
+          <a:blip r:embed="rId10"/>
+          <a:srcRect l="-3215" t="51911" r="2433" b="25493"/>
+          <a:stretch/>
+        </p:blipFill>
+        <p:spPr>
+          <a:xfrm>
+            <a:off x="11414451" y="6348549"/>
+            <a:ext cx="540993" cy="509451"/>
           </a:xfrm>
           <a:prstGeom prst="rect">
             <a:avLst/>
@@ -9495,7 +9590,7 @@
         </p:blipFill>
         <p:spPr>
           <a:xfrm>
-            <a:off x="1568684" y="860352"/>
+            <a:off x="1384221" y="860352"/>
             <a:ext cx="4004746" cy="5141613"/>
           </a:xfrm>
           <a:prstGeom prst="rect">
@@ -9688,7 +9783,7 @@
         </p:blipFill>
         <p:spPr>
           <a:xfrm>
-            <a:off x="2964252" y="6042072"/>
+            <a:off x="2798131" y="6042072"/>
             <a:ext cx="858944" cy="717408"/>
           </a:xfrm>
           <a:prstGeom prst="rect">
@@ -9760,22 +9855,22 @@
       </p:sp>
       <p:sp>
         <p:nvSpPr>
-          <p:cNvPr id="23" name="Rectangle 22"/>
+          <p:cNvPr id="19" name="Rectangle 18"/>
           <p:cNvSpPr/>
           <p:nvPr/>
         </p:nvSpPr>
         <p:spPr>
           <a:xfrm>
-            <a:off x="3208686" y="5644014"/>
+            <a:off x="8532855" y="5665379"/>
             <a:ext cx="370077" cy="333891"/>
           </a:xfrm>
           <a:prstGeom prst="rect">
             <a:avLst/>
           </a:prstGeom>
           <a:noFill/>
-          <a:ln>
+          <a:ln w="76200">
             <a:solidFill>
-              <a:schemeClr val="accent2"/>
+              <a:srgbClr val="FF6CFD"/>
             </a:solidFill>
           </a:ln>
         </p:spPr>
@@ -9804,24 +9899,47 @@
           </a:p>
         </p:txBody>
       </p:sp>
-      <p:sp>
-        <p:nvSpPr>
-          <p:cNvPr id="19" name="Rectangle 18"/>
+      <p:pic>
+        <p:nvPicPr>
+          <p:cNvPr id="26" name="Image 25"/>
+          <p:cNvPicPr>
+            <a:picLocks noChangeAspect="1"/>
+          </p:cNvPicPr>
+          <p:nvPr/>
+        </p:nvPicPr>
+        <p:blipFill rotWithShape="1">
+          <a:blip r:embed="rId7"/>
+          <a:srcRect l="-781" t="27577" b="49827"/>
+          <a:stretch/>
+        </p:blipFill>
+        <p:spPr>
+          <a:xfrm>
+            <a:off x="11414451" y="6348549"/>
+            <a:ext cx="540993" cy="509451"/>
+          </a:xfrm>
+          <a:prstGeom prst="rect">
+            <a:avLst/>
+          </a:prstGeom>
+        </p:spPr>
+      </p:pic>
+      <p:sp>
+        <p:nvSpPr>
+          <p:cNvPr id="27" name="Rectangle 26"/>
           <p:cNvSpPr/>
           <p:nvPr/>
         </p:nvSpPr>
         <p:spPr>
           <a:xfrm>
-            <a:off x="8532855" y="5665379"/>
+            <a:off x="3016517" y="5647707"/>
             <a:ext cx="370077" cy="333891"/>
           </a:xfrm>
           <a:prstGeom prst="rect">
             <a:avLst/>
           </a:prstGeom>
           <a:noFill/>
-          <a:ln>
+          <a:ln w="76200">
             <a:solidFill>
-              <a:schemeClr val="accent2"/>
+              <a:srgbClr val="FF6CFD"/>
             </a:solidFill>
           </a:ln>
         </p:spPr>
@@ -10066,7 +10184,7 @@
         </p:blipFill>
         <p:spPr>
           <a:xfrm>
-            <a:off x="1662588" y="5669280"/>
+            <a:off x="838080" y="5669280"/>
             <a:ext cx="2163279" cy="1005840"/>
           </a:xfrm>
           <a:prstGeom prst="rect">
@@ -10112,8 +10230,31 @@
         </p:blipFill>
         <p:spPr>
           <a:xfrm>
-            <a:off x="7675777" y="5924147"/>
+            <a:off x="8542296" y="5966671"/>
             <a:ext cx="2029584" cy="750973"/>
+          </a:xfrm>
+          <a:prstGeom prst="rect">
+            <a:avLst/>
+          </a:prstGeom>
+        </p:spPr>
+      </p:pic>
+      <p:pic>
+        <p:nvPicPr>
+          <p:cNvPr id="16" name="Image 15"/>
+          <p:cNvPicPr>
+            <a:picLocks noChangeAspect="1"/>
+          </p:cNvPicPr>
+          <p:nvPr/>
+        </p:nvPicPr>
+        <p:blipFill rotWithShape="1">
+          <a:blip r:embed="rId7"/>
+          <a:srcRect l="-781" t="27577" b="49827"/>
+          <a:stretch/>
+        </p:blipFill>
+        <p:spPr>
+          <a:xfrm>
+            <a:off x="11414451" y="6348549"/>
+            <a:ext cx="540993" cy="509451"/>
           </a:xfrm>
           <a:prstGeom prst="rect">
             <a:avLst/>
@@ -10700,7 +10841,7 @@
         </p:blipFill>
         <p:spPr>
           <a:xfrm>
-            <a:off x="10188386" y="4670185"/>
+            <a:off x="9300112" y="3752002"/>
             <a:ext cx="1026694" cy="1138989"/>
           </a:xfrm>
           <a:prstGeom prst="rect">
@@ -10817,6 +10958,29 @@
           </a:p>
         </p:txBody>
       </p:sp>
+      <p:pic>
+        <p:nvPicPr>
+          <p:cNvPr id="14" name="Image 13"/>
+          <p:cNvPicPr>
+            <a:picLocks noChangeAspect="1"/>
+          </p:cNvPicPr>
+          <p:nvPr/>
+        </p:nvPicPr>
+        <p:blipFill rotWithShape="1">
+          <a:blip r:embed="rId7"/>
+          <a:srcRect l="1653" t="52490" r="-2434" b="24914"/>
+          <a:stretch/>
+        </p:blipFill>
+        <p:spPr>
+          <a:xfrm>
+            <a:off x="11414451" y="6348549"/>
+            <a:ext cx="540993" cy="509451"/>
+          </a:xfrm>
+          <a:prstGeom prst="rect">
+            <a:avLst/>
+          </a:prstGeom>
+        </p:spPr>
+      </p:pic>
     </p:spTree>
     <p:extLst>
       <p:ext uri="{BB962C8B-B14F-4D97-AF65-F5344CB8AC3E}">
@@ -11573,6 +11737,29 @@
           </p:txBody>
         </p:sp>
       </p:grpSp>
+      <p:pic>
+        <p:nvPicPr>
+          <p:cNvPr id="16" name="Image 15"/>
+          <p:cNvPicPr>
+            <a:picLocks noChangeAspect="1"/>
+          </p:cNvPicPr>
+          <p:nvPr/>
+        </p:nvPicPr>
+        <p:blipFill rotWithShape="1">
+          <a:blip r:embed="rId8"/>
+          <a:srcRect l="-781" t="346" b="77058"/>
+          <a:stretch/>
+        </p:blipFill>
+        <p:spPr>
+          <a:xfrm>
+            <a:off x="11414451" y="6348549"/>
+            <a:ext cx="540993" cy="509451"/>
+          </a:xfrm>
+          <a:prstGeom prst="rect">
+            <a:avLst/>
+          </a:prstGeom>
+        </p:spPr>
+      </p:pic>
     </p:spTree>
     <p:extLst>
       <p:ext uri="{BB962C8B-B14F-4D97-AF65-F5344CB8AC3E}">
@@ -12106,6 +12293,29 @@
           </a:p>
         </p:txBody>
       </p:sp>
+      <p:pic>
+        <p:nvPicPr>
+          <p:cNvPr id="14" name="Image 13"/>
+          <p:cNvPicPr>
+            <a:picLocks noChangeAspect="1"/>
+          </p:cNvPicPr>
+          <p:nvPr/>
+        </p:nvPicPr>
+        <p:blipFill rotWithShape="1">
+          <a:blip r:embed="rId7"/>
+          <a:srcRect l="-781" t="52490" b="24914"/>
+          <a:stretch/>
+        </p:blipFill>
+        <p:spPr>
+          <a:xfrm>
+            <a:off x="11414451" y="6348549"/>
+            <a:ext cx="540993" cy="509451"/>
+          </a:xfrm>
+          <a:prstGeom prst="rect">
+            <a:avLst/>
+          </a:prstGeom>
+        </p:spPr>
+      </p:pic>
     </p:spTree>
     <p:extLst>
       <p:ext uri="{BB962C8B-B14F-4D97-AF65-F5344CB8AC3E}">

</xml_diff>